<commit_message>
fix my part again
</commit_message>
<xml_diff>
--- a/Presentation.pptx
+++ b/Presentation.pptx
@@ -17,7 +17,6 @@
     <p:sldId id="269" r:id="rId11"/>
     <p:sldId id="266" r:id="rId12"/>
     <p:sldId id="268" r:id="rId13"/>
-    <p:sldId id="270" r:id="rId14"/>
   </p:sldIdLst>
   <p:sldSz cx="12192000" cy="6858000"/>
   <p:notesSz cx="6858000" cy="9144000"/>
@@ -5488,7 +5487,7 @@
     </p:spTree>
     <p:extLst>
       <p:ext uri="{BB962C8B-B14F-4D97-AF65-F5344CB8AC3E}">
-        <p14:creationId xmlns:p14="http://schemas.microsoft.com/office/powerpoint/2010/main" xmlns="" val="3018234246"/>
+        <p14:creationId xmlns="" xmlns:p14="http://schemas.microsoft.com/office/powerpoint/2010/main" val="3018234246"/>
       </p:ext>
     </p:extLst>
   </p:cSld>
@@ -5575,15 +5574,7 @@
           <a:p>
             <a:r>
               <a:rPr lang="en-US" dirty="0" smtClean="0"/>
-              <a:t>Known </a:t>
-            </a:r>
-            <a:r>
-              <a:rPr lang="en-US" dirty="0" smtClean="0"/>
-              <a:t>Bugs</a:t>
-            </a:r>
-            <a:r>
-              <a:rPr lang="en-US" dirty="0" smtClean="0"/>
-              <a:t>:</a:t>
+              <a:t>Known Bugs:</a:t>
             </a:r>
           </a:p>
           <a:p>
@@ -5596,11 +5587,7 @@
             </a:pPr>
             <a:r>
               <a:rPr lang="en-US" dirty="0" smtClean="0"/>
-              <a:t>Can’t </a:t>
-            </a:r>
-            <a:r>
-              <a:rPr lang="en-US" dirty="0" smtClean="0"/>
-              <a:t>save an edited </a:t>
+              <a:t>Can’t save an edited </a:t>
             </a:r>
             <a:r>
               <a:rPr lang="en-US" dirty="0" err="1" smtClean="0"/>
@@ -5608,11 +5595,7 @@
             </a:r>
             <a:r>
               <a:rPr lang="en-US" dirty="0" smtClean="0"/>
-              <a:t> </a:t>
-            </a:r>
-            <a:r>
-              <a:rPr lang="en-US" dirty="0" smtClean="0"/>
-              <a:t>search</a:t>
+              <a:t> search</a:t>
             </a:r>
           </a:p>
           <a:p>
@@ -5622,11 +5605,7 @@
             </a:pPr>
             <a:r>
               <a:rPr lang="en-US" dirty="0" smtClean="0"/>
-              <a:t>After </a:t>
-            </a:r>
-            <a:r>
-              <a:rPr lang="en-US" dirty="0" smtClean="0"/>
-              <a:t>selecting a previous search from dropdown, dropdown defaults back to only having the "Custom Search" option. </a:t>
+              <a:t>After selecting a previous search from dropdown, dropdown defaults back to only having the "Custom Search" option. </a:t>
             </a:r>
           </a:p>
           <a:p>
@@ -5636,11 +5615,7 @@
             </a:pPr>
             <a:r>
               <a:rPr lang="en-US" dirty="0" smtClean="0"/>
-              <a:t> </a:t>
-            </a:r>
-            <a:r>
-              <a:rPr lang="en-US" dirty="0" smtClean="0"/>
-              <a:t>Prints errors randomly (???)</a:t>
+              <a:t> Prints errors randomly (???)</a:t>
             </a:r>
           </a:p>
           <a:p>
@@ -5685,7 +5660,7 @@
     </p:spTree>
     <p:extLst>
       <p:ext uri="{BB962C8B-B14F-4D97-AF65-F5344CB8AC3E}">
-        <p14:creationId xmlns:p14="http://schemas.microsoft.com/office/powerpoint/2010/main" xmlns="" val="2458156186"/>
+        <p14:creationId xmlns="" xmlns:p14="http://schemas.microsoft.com/office/powerpoint/2010/main" val="2458156186"/>
       </p:ext>
     </p:extLst>
   </p:cSld>
@@ -5782,11 +5757,7 @@
           <a:p>
             <a:r>
               <a:rPr lang="en-US" dirty="0" smtClean="0"/>
-              <a:t>	</a:t>
-            </a:r>
-            <a:r>
-              <a:rPr lang="en-US" dirty="0" smtClean="0"/>
-              <a:t>- decrease/sort the codes </a:t>
+              <a:t>	- decrease/sort the codes </a:t>
             </a:r>
           </a:p>
           <a:p>
@@ -5798,23 +5769,14 @@
           <a:p>
             <a:r>
               <a:rPr lang="en-US" dirty="0" smtClean="0"/>
-              <a:t>	</a:t>
-            </a:r>
+              <a:t>	- program runs more efficiently</a:t>
+            </a:r>
+          </a:p>
+          <a:p>
             <a:r>
               <a:rPr lang="en-US" dirty="0" smtClean="0"/>
-              <a:t>- program runs more efficiently</a:t>
-            </a:r>
-          </a:p>
-          <a:p>
-            <a:r>
-              <a:rPr lang="en-US" dirty="0" smtClean="0"/>
-              <a:t>	</a:t>
-            </a:r>
-            <a:r>
-              <a:rPr lang="en-US" dirty="0" smtClean="0"/>
-              <a:t>- delete unnecessary codes</a:t>
-            </a:r>
-            <a:endParaRPr lang="en-US" dirty="0" smtClean="0"/>
+              <a:t>	- delete unnecessary codes</a:t>
+            </a:r>
           </a:p>
           <a:p>
             <a:endParaRPr lang="en-US" dirty="0" smtClean="0"/>
@@ -5828,21 +5790,13 @@
           <a:p>
             <a:r>
               <a:rPr lang="en-US" dirty="0" smtClean="0"/>
-              <a:t>	</a:t>
-            </a:r>
+              <a:t>	-black box testing</a:t>
+            </a:r>
+          </a:p>
+          <a:p>
             <a:r>
               <a:rPr lang="en-US" dirty="0" smtClean="0"/>
-              <a:t>-black box testing</a:t>
-            </a:r>
-          </a:p>
-          <a:p>
-            <a:r>
-              <a:rPr lang="en-US" dirty="0" smtClean="0"/>
-              <a:t>	</a:t>
-            </a:r>
-            <a:r>
-              <a:rPr lang="en-US" dirty="0" smtClean="0"/>
-              <a:t>-white box testing </a:t>
+              <a:t>	-white box testing </a:t>
             </a:r>
           </a:p>
           <a:p>
@@ -5859,7 +5813,7 @@
     </p:spTree>
     <p:extLst>
       <p:ext uri="{BB962C8B-B14F-4D97-AF65-F5344CB8AC3E}">
-        <p14:creationId xmlns:p14="http://schemas.microsoft.com/office/powerpoint/2010/main" xmlns="" val="2458156186"/>
+        <p14:creationId xmlns="" xmlns:p14="http://schemas.microsoft.com/office/powerpoint/2010/main" val="2458156186"/>
       </p:ext>
     </p:extLst>
   </p:cSld>
@@ -5932,7 +5886,7 @@
         <p:spPr>
           <a:xfrm>
             <a:off x="1233714" y="1959429"/>
-            <a:ext cx="8723086" cy="3139321"/>
+            <a:ext cx="9114972" cy="4247317"/>
           </a:xfrm>
           <a:prstGeom prst="rect">
             <a:avLst/>
@@ -5956,11 +5910,7 @@
             </a:pPr>
             <a:r>
               <a:rPr lang="en-US" dirty="0" smtClean="0"/>
-              <a:t>window </a:t>
-            </a:r>
-            <a:r>
-              <a:rPr lang="en-US" dirty="0" smtClean="0"/>
-              <a:t>flow</a:t>
+              <a:t>window flow</a:t>
             </a:r>
           </a:p>
           <a:p>
@@ -5970,11 +5920,7 @@
             </a:pPr>
             <a:r>
               <a:rPr lang="en-US" dirty="0" smtClean="0"/>
-              <a:t>user </a:t>
-            </a:r>
-            <a:r>
-              <a:rPr lang="en-US" dirty="0" smtClean="0"/>
-              <a:t>authentication</a:t>
+              <a:t>user authentication</a:t>
             </a:r>
           </a:p>
           <a:p>
@@ -5984,11 +5930,7 @@
             </a:pPr>
             <a:r>
               <a:rPr lang="en-US" dirty="0" smtClean="0"/>
-              <a:t>add/edit/remove </a:t>
-            </a:r>
-            <a:r>
-              <a:rPr lang="en-US" dirty="0" smtClean="0"/>
-              <a:t>current/</a:t>
+              <a:t>add/edit/remove current/</a:t>
             </a:r>
             <a:r>
               <a:rPr lang="en-US" dirty="0" err="1" smtClean="0"/>
@@ -6026,11 +5968,7 @@
             </a:pPr>
             <a:r>
               <a:rPr lang="en-US" dirty="0" smtClean="0"/>
-              <a:t>Ensure </a:t>
-            </a:r>
-            <a:r>
-              <a:rPr lang="en-US" dirty="0" smtClean="0"/>
-              <a:t>all location in database are correct. (There's a few that aren't in the US)</a:t>
+              <a:t>Ensure all location in database are correct. (There's a few that aren't in the US)</a:t>
             </a:r>
           </a:p>
           <a:p>
@@ -6040,11 +5978,7 @@
             </a:pPr>
             <a:r>
               <a:rPr lang="en-US" dirty="0" smtClean="0"/>
-              <a:t>Ensure </a:t>
-            </a:r>
-            <a:r>
-              <a:rPr lang="en-US" dirty="0" smtClean="0"/>
-              <a:t>there are over 100 locations in database (I think now we only have ~80) Also, ensure all locations are unique. </a:t>
+              <a:t>Ensure there are over 100 locations in database (I think now we only have ~80) Also, ensure all locations are unique. </a:t>
             </a:r>
           </a:p>
           <a:p>
@@ -6054,17 +5988,42 @@
             </a:pPr>
             <a:r>
               <a:rPr lang="en-US" dirty="0" smtClean="0"/>
-              <a:t>Ensure </a:t>
-            </a:r>
-            <a:r>
-              <a:rPr lang="en-US" dirty="0" smtClean="0"/>
-              <a:t>all fields of previous searches are stored correctly</a:t>
+              <a:t>Ensure all fields of previous searches are stored correctly</a:t>
             </a:r>
             <a:r>
               <a:rPr lang="en-US" dirty="0" smtClean="0"/>
               <a:t>.</a:t>
             </a:r>
-            <a:endParaRPr lang="en-US" dirty="0" smtClean="0"/>
+          </a:p>
+          <a:p>
+            <a:pPr>
+              <a:buFont typeface="Arial" pitchFamily="34" charset="0"/>
+              <a:buChar char="•"/>
+            </a:pPr>
+            <a:r>
+              <a:rPr lang="en-US" dirty="0" smtClean="0"/>
+              <a:t>Close switch/information windows with escape button</a:t>
+            </a:r>
+          </a:p>
+          <a:p>
+            <a:pPr>
+              <a:buFont typeface="Arial" pitchFamily="34" charset="0"/>
+              <a:buChar char="•"/>
+            </a:pPr>
+            <a:r>
+              <a:rPr lang="en-US" dirty="0" smtClean="0"/>
+              <a:t>When searching for a new location to add, title of dialog is "Select an Option"; should be something better. Also, that message should be cleaner. </a:t>
+            </a:r>
+          </a:p>
+          <a:p>
+            <a:pPr>
+              <a:buFont typeface="Arial" pitchFamily="34" charset="0"/>
+              <a:buChar char="•"/>
+            </a:pPr>
+            <a:r>
+              <a:rPr lang="en-US" dirty="0" smtClean="0"/>
+              <a:t> Speed of trip attribute should be displayed somewhere</a:t>
+            </a:r>
           </a:p>
           <a:p>
             <a:pPr>
@@ -6073,101 +6032,6 @@
             </a:pPr>
             <a:endParaRPr lang="en-US" dirty="0" smtClean="0"/>
           </a:p>
-        </p:txBody>
-      </p:sp>
-    </p:spTree>
-    <p:extLst>
-      <p:ext uri="{BB962C8B-B14F-4D97-AF65-F5344CB8AC3E}">
-        <p14:creationId xmlns:p14="http://schemas.microsoft.com/office/powerpoint/2010/main" xmlns="" val="2458156186"/>
-      </p:ext>
-    </p:extLst>
-  </p:cSld>
-  <p:clrMapOvr>
-    <a:masterClrMapping/>
-  </p:clrMapOvr>
-  <p:timing>
-    <p:tnLst>
-      <p:par>
-        <p:cTn id="1" dur="indefinite" restart="never" nodeType="tmRoot"/>
-      </p:par>
-    </p:tnLst>
-  </p:timing>
-</p:sld>
-</file>
-
-<file path=ppt/slides/slide13.xml><?xml version="1.0" encoding="utf-8"?>
-<p:sld xmlns:a="http://schemas.openxmlformats.org/drawingml/2006/main" xmlns:r="http://schemas.openxmlformats.org/officeDocument/2006/relationships" xmlns:p="http://schemas.openxmlformats.org/presentationml/2006/main">
-  <p:cSld>
-    <p:spTree>
-      <p:nvGrpSpPr>
-        <p:cNvPr id="1" name=""/>
-        <p:cNvGrpSpPr/>
-        <p:nvPr/>
-      </p:nvGrpSpPr>
-      <p:grpSpPr>
-        <a:xfrm>
-          <a:off x="0" y="0"/>
-          <a:ext cx="0" cy="0"/>
-          <a:chOff x="0" y="0"/>
-          <a:chExt cx="0" cy="0"/>
-        </a:xfrm>
-      </p:grpSpPr>
-      <p:sp>
-        <p:nvSpPr>
-          <p:cNvPr id="2" name="TextBox 1"/>
-          <p:cNvSpPr txBox="1"/>
-          <p:nvPr/>
-        </p:nvSpPr>
-        <p:spPr>
-          <a:xfrm>
-            <a:off x="4317357" y="740780"/>
-            <a:ext cx="3050835" cy="707886"/>
-          </a:xfrm>
-          <a:prstGeom prst="rect">
-            <a:avLst/>
-          </a:prstGeom>
-          <a:noFill/>
-        </p:spPr>
-        <p:txBody>
-          <a:bodyPr wrap="none" rtlCol="0">
-            <a:spAutoFit/>
-          </a:bodyPr>
-          <a:lstStyle/>
-          <a:p>
-            <a:r>
-              <a:rPr lang="en-US" sz="4000" dirty="0" smtClean="0"/>
-              <a:t>TODO/Bugs</a:t>
-            </a:r>
-            <a:endParaRPr lang="en-US" sz="4000" dirty="0"/>
-          </a:p>
-        </p:txBody>
-      </p:sp>
-      <p:sp>
-        <p:nvSpPr>
-          <p:cNvPr id="3" name="직사각형 2"/>
-          <p:cNvSpPr/>
-          <p:nvPr/>
-        </p:nvSpPr>
-        <p:spPr>
-          <a:xfrm>
-            <a:off x="1233714" y="1959429"/>
-            <a:ext cx="8723086" cy="2862322"/>
-          </a:xfrm>
-          <a:prstGeom prst="rect">
-            <a:avLst/>
-          </a:prstGeom>
-        </p:spPr>
-        <p:txBody>
-          <a:bodyPr wrap="square">
-            <a:spAutoFit/>
-          </a:bodyPr>
-          <a:lstStyle/>
-          <a:p>
-            <a:r>
-              <a:rPr lang="en-US" dirty="0" smtClean="0"/>
-              <a:t>Things that need to be tested:</a:t>
-            </a:r>
-          </a:p>
           <a:p>
             <a:pPr>
               <a:buFont typeface="Arial" pitchFamily="34" charset="0"/>
@@ -6175,111 +6039,12 @@
             </a:pPr>
             <a:endParaRPr lang="en-US" dirty="0" smtClean="0"/>
           </a:p>
-          <a:p>
-            <a:pPr>
-              <a:buFont typeface="Arial" pitchFamily="34" charset="0"/>
-              <a:buChar char="•"/>
-            </a:pPr>
-            <a:r>
-              <a:rPr lang="en-US" dirty="0" smtClean="0"/>
-              <a:t>Close switch/information windows with escape button</a:t>
-            </a:r>
-          </a:p>
-          <a:p>
-            <a:pPr>
-              <a:buFont typeface="Arial" pitchFamily="34" charset="0"/>
-              <a:buChar char="•"/>
-            </a:pPr>
-            <a:r>
-              <a:rPr lang="en-US" dirty="0" err="1" smtClean="0"/>
-              <a:t>Guis</a:t>
-            </a:r>
-            <a:r>
-              <a:rPr lang="en-US" dirty="0" smtClean="0"/>
-              <a:t> </a:t>
-            </a:r>
-            <a:r>
-              <a:rPr lang="en-US" dirty="0" smtClean="0"/>
-              <a:t>have empty methods and TODO stubs</a:t>
-            </a:r>
-          </a:p>
-          <a:p>
-            <a:pPr>
-              <a:buFont typeface="Arial" pitchFamily="34" charset="0"/>
-              <a:buChar char="•"/>
-            </a:pPr>
-            <a:r>
-              <a:rPr lang="en-US" dirty="0" smtClean="0"/>
-              <a:t> </a:t>
-            </a:r>
-            <a:r>
-              <a:rPr lang="en-US" dirty="0" err="1" smtClean="0"/>
-              <a:t>UImanager</a:t>
-            </a:r>
-            <a:r>
-              <a:rPr lang="en-US" dirty="0" smtClean="0"/>
-              <a:t> not finished *NOT A BUG*</a:t>
-            </a:r>
-          </a:p>
-          <a:p>
-            <a:pPr lvl="1">
-              <a:buFont typeface="Arial" pitchFamily="34" charset="0"/>
-              <a:buChar char="•"/>
-            </a:pPr>
-            <a:r>
-              <a:rPr lang="en-US" dirty="0" smtClean="0"/>
-              <a:t> Design of </a:t>
-            </a:r>
-            <a:r>
-              <a:rPr lang="en-US" dirty="0" err="1" smtClean="0"/>
-              <a:t>UIManager</a:t>
-            </a:r>
-            <a:r>
-              <a:rPr lang="en-US" dirty="0" smtClean="0"/>
-              <a:t> changed by </a:t>
-            </a:r>
-            <a:r>
-              <a:rPr lang="en-US" dirty="0" err="1" smtClean="0"/>
-              <a:t>gui</a:t>
-            </a:r>
-            <a:r>
-              <a:rPr lang="en-US" dirty="0" smtClean="0"/>
-              <a:t> package it was created on. </a:t>
-            </a:r>
-          </a:p>
-          <a:p>
-            <a:pPr>
-              <a:buFont typeface="Arial" pitchFamily="34" charset="0"/>
-              <a:buChar char="•"/>
-            </a:pPr>
-            <a:r>
-              <a:rPr lang="en-US" dirty="0" smtClean="0"/>
-              <a:t> When searching for a new location to add, title of dialog is "Select an Option"; should be something better. Also, that message should be cleaner. </a:t>
-            </a:r>
-          </a:p>
-          <a:p>
-            <a:pPr>
-              <a:buFont typeface="Arial" pitchFamily="34" charset="0"/>
-              <a:buChar char="•"/>
-            </a:pPr>
-            <a:r>
-              <a:rPr lang="en-US" dirty="0" smtClean="0"/>
-              <a:t> Speed of trip attribute should be displayed somewhere</a:t>
-            </a:r>
-          </a:p>
-          <a:p>
-            <a:pPr>
-              <a:buFont typeface="Arial" pitchFamily="34" charset="0"/>
-              <a:buChar char="•"/>
-            </a:pPr>
-            <a:endParaRPr lang="en-US" dirty="0" smtClean="0"/>
-          </a:p>
         </p:txBody>
       </p:sp>
     </p:spTree>
     <p:extLst>
       <p:ext uri="{BB962C8B-B14F-4D97-AF65-F5344CB8AC3E}">
-        <p14:creationId xmlns:p14="http://schemas.microsoft.com/office/powerpoint/2010/main" xmlns="" val="2458156186"/>
+        <p14:creationId xmlns="" xmlns:p14="http://schemas.microsoft.com/office/powerpoint/2010/main" val="2458156186"/>
       </p:ext>
     </p:extLst>
   </p:cSld>
@@ -6525,7 +6290,7 @@
     </p:spTree>
     <p:extLst>
       <p:ext uri="{BB962C8B-B14F-4D97-AF65-F5344CB8AC3E}">
-        <p14:creationId xmlns:p14="http://schemas.microsoft.com/office/powerpoint/2010/main" xmlns="" val="4081833914"/>
+        <p14:creationId xmlns="" xmlns:p14="http://schemas.microsoft.com/office/powerpoint/2010/main" val="4081833914"/>
       </p:ext>
     </p:extLst>
   </p:cSld>
@@ -6705,7 +6470,7 @@
     </p:spTree>
     <p:extLst>
       <p:ext uri="{BB962C8B-B14F-4D97-AF65-F5344CB8AC3E}">
-        <p14:creationId xmlns:p14="http://schemas.microsoft.com/office/powerpoint/2010/main" xmlns="" val="2338439490"/>
+        <p14:creationId xmlns="" xmlns:p14="http://schemas.microsoft.com/office/powerpoint/2010/main" val="2338439490"/>
       </p:ext>
     </p:extLst>
   </p:cSld>
@@ -6927,7 +6692,7 @@
     </p:spTree>
     <p:extLst>
       <p:ext uri="{BB962C8B-B14F-4D97-AF65-F5344CB8AC3E}">
-        <p14:creationId xmlns:p14="http://schemas.microsoft.com/office/powerpoint/2010/main" xmlns="" val="4212070107"/>
+        <p14:creationId xmlns="" xmlns:p14="http://schemas.microsoft.com/office/powerpoint/2010/main" val="4212070107"/>
       </p:ext>
     </p:extLst>
   </p:cSld>
@@ -7205,7 +6970,7 @@
     </p:spTree>
     <p:extLst>
       <p:ext uri="{BB962C8B-B14F-4D97-AF65-F5344CB8AC3E}">
-        <p14:creationId xmlns:p14="http://schemas.microsoft.com/office/powerpoint/2010/main" xmlns="" val="3053572577"/>
+        <p14:creationId xmlns="" xmlns:p14="http://schemas.microsoft.com/office/powerpoint/2010/main" val="3053572577"/>
       </p:ext>
     </p:extLst>
   </p:cSld>
@@ -7262,14 +7027,14 @@
           <a:effectLst/>
           <a:extLst>
             <a:ext uri="{909E8E84-426E-40DD-AFC4-6F175D3DCCD1}">
-              <a14:hiddenFill xmlns:a14="http://schemas.microsoft.com/office/drawing/2010/main" xmlns="">
+              <a14:hiddenFill xmlns="" xmlns:a14="http://schemas.microsoft.com/office/drawing/2010/main">
                 <a:solidFill>
                   <a:schemeClr val="accent1"/>
                 </a:solidFill>
               </a14:hiddenFill>
             </a:ext>
             <a:ext uri="{91240B29-F687-4F45-9708-019B960494DF}">
-              <a14:hiddenLine xmlns:a14="http://schemas.microsoft.com/office/drawing/2010/main" xmlns="" w="9525">
+              <a14:hiddenLine xmlns="" xmlns:a14="http://schemas.microsoft.com/office/drawing/2010/main" w="9525">
                 <a:solidFill>
                   <a:schemeClr val="tx1"/>
                 </a:solidFill>
@@ -7279,7 +7044,7 @@
               </a14:hiddenLine>
             </a:ext>
             <a:ext uri="{AF507438-7753-43E0-B8FC-AC1667EBCBE1}">
-              <a14:hiddenEffects xmlns:a14="http://schemas.microsoft.com/office/drawing/2010/main" xmlns="">
+              <a14:hiddenEffects xmlns="" xmlns:a14="http://schemas.microsoft.com/office/drawing/2010/main">
                 <a:effectLst>
                   <a:outerShdw dist="35921" dir="2700000" algn="ctr" rotWithShape="0">
                     <a:schemeClr val="bg2"/>
@@ -7362,7 +7127,7 @@
     </p:spTree>
     <p:extLst>
       <p:ext uri="{BB962C8B-B14F-4D97-AF65-F5344CB8AC3E}">
-        <p14:creationId xmlns:p14="http://schemas.microsoft.com/office/powerpoint/2010/main" xmlns="" val="2974542872"/>
+        <p14:creationId xmlns="" xmlns:p14="http://schemas.microsoft.com/office/powerpoint/2010/main" val="2974542872"/>
       </p:ext>
     </p:extLst>
   </p:cSld>
@@ -7423,7 +7188,7 @@
     </p:spTree>
     <p:extLst>
       <p:ext uri="{BB962C8B-B14F-4D97-AF65-F5344CB8AC3E}">
-        <p14:creationId xmlns:p14="http://schemas.microsoft.com/office/powerpoint/2010/main" xmlns="" val="944689574"/>
+        <p14:creationId xmlns="" xmlns:p14="http://schemas.microsoft.com/office/powerpoint/2010/main" val="944689574"/>
       </p:ext>
     </p:extLst>
   </p:cSld>
@@ -7633,7 +7398,7 @@
     </p:spTree>
     <p:extLst>
       <p:ext uri="{BB962C8B-B14F-4D97-AF65-F5344CB8AC3E}">
-        <p14:creationId xmlns:p14="http://schemas.microsoft.com/office/powerpoint/2010/main" xmlns="" val="2904455565"/>
+        <p14:creationId xmlns="" xmlns:p14="http://schemas.microsoft.com/office/powerpoint/2010/main" val="2904455565"/>
       </p:ext>
     </p:extLst>
   </p:cSld>
@@ -7984,7 +7749,7 @@
     </p:spTree>
     <p:extLst>
       <p:ext uri="{BB962C8B-B14F-4D97-AF65-F5344CB8AC3E}">
-        <p14:creationId xmlns:p14="http://schemas.microsoft.com/office/powerpoint/2010/main" xmlns="" val="3552221480"/>
+        <p14:creationId xmlns="" xmlns:p14="http://schemas.microsoft.com/office/powerpoint/2010/main" val="3552221480"/>
       </p:ext>
     </p:extLst>
   </p:cSld>
@@ -8269,7 +8034,7 @@
   <a:extraClrSchemeLst/>
   <a:extLst>
     <a:ext uri="{05A4C25C-085E-4340-85A3-A5531E510DB2}">
-      <thm15:themeFamily xmlns:thm15="http://schemas.microsoft.com/office/thememl/2012/main" xmlns="" name="Slice" id="{0507925B-6AC9-4358-8E18-C330545D08F8}" vid="{13FEC7C6-62A9-40C4-99D2-581AACACAA2F}"/>
+      <thm15:themeFamily xmlns="" xmlns:thm15="http://schemas.microsoft.com/office/thememl/2012/main" name="Slice" id="{0507925B-6AC9-4358-8E18-C330545D08F8}" vid="{13FEC7C6-62A9-40C4-99D2-581AACACAA2F}"/>
     </a:ext>
   </a:extLst>
 </a:theme>

</xml_diff>